<commit_message>
Refactor naming and update tests formatting
</commit_message>
<xml_diff>
--- a/test/ShapeCrawler.Tests.Unit/Assets/autoshape/autoshape-case017_slide-number.pptx
+++ b/test/ShapeCrawler.Tests.Unit/Assets/autoshape/autoshape-case017_slide-number.pptx
@@ -217,7 +217,7 @@
           <a:p>
             <a:fld id="{2C091AF3-F71D-488C-915C-E617C63FA6C3}" type="datetimeFigureOut">
               <a:rPr lang="ru-RU" smtClean="0"/>
-              <a:t>14.05.2022</a:t>
+              <a:t>24.08.2024</a:t>
             </a:fld>
             <a:endParaRPr lang="ru-RU"/>
           </a:p>
@@ -671,7 +671,7 @@
           <a:p>
             <a:fld id="{1D8BD707-D9CF-40AE-B4C6-C98DA3205C09}" type="datetimeFigureOut">
               <a:rPr lang="en-US"/>
-              <a:t>5/14/2022</a:t>
+              <a:t>8/24/2024</a:t>
             </a:fld>
             <a:endParaRPr lang="en-US"/>
           </a:p>
@@ -896,7 +896,7 @@
           <a:p>
             <a:fld id="{1D8BD707-D9CF-40AE-B4C6-C98DA3205C09}" type="datetimeFigureOut">
               <a:rPr lang="en-US"/>
-              <a:t>5/14/2022</a:t>
+              <a:t>8/24/2024</a:t>
             </a:fld>
             <a:endParaRPr lang="en-US"/>
           </a:p>
@@ -1158,7 +1158,7 @@
           <a:p>
             <a:fld id="{1D8BD707-D9CF-40AE-B4C6-C98DA3205C09}" type="datetimeFigureOut">
               <a:rPr lang="en-US"/>
-              <a:t>5/14/2022</a:t>
+              <a:t>8/24/2024</a:t>
             </a:fld>
             <a:endParaRPr lang="en-US"/>
           </a:p>
@@ -1354,7 +1354,7 @@
           <a:p>
             <a:fld id="{1D8BD707-D9CF-40AE-B4C6-C98DA3205C09}" type="datetimeFigureOut">
               <a:rPr lang="en-US"/>
-              <a:t>5/14/2022</a:t>
+              <a:t>8/24/2024</a:t>
             </a:fld>
             <a:endParaRPr lang="en-US"/>
           </a:p>
@@ -1903,7 +1903,7 @@
           <a:p>
             <a:fld id="{1D8BD707-D9CF-40AE-B4C6-C98DA3205C09}" type="datetimeFigureOut">
               <a:rPr lang="en-US"/>
-              <a:t>5/14/2022</a:t>
+              <a:t>8/24/2024</a:t>
             </a:fld>
             <a:endParaRPr lang="en-US"/>
           </a:p>
@@ -2167,7 +2167,7 @@
       </p:sp>
       <p:sp>
         <p:nvSpPr>
-          <p:cNvPr id="3" name="Holder 3"/>
+          <p:cNvPr id="3" name="Shape 1"/>
           <p:cNvSpPr>
             <a:spLocks noGrp="1"/>
           </p:cNvSpPr>
@@ -2328,7 +2328,7 @@
           <a:p>
             <a:fld id="{1D8BD707-D9CF-40AE-B4C6-C98DA3205C09}" type="datetimeFigureOut">
               <a:rPr lang="en-US"/>
-              <a:t>5/14/2022</a:t>
+              <a:t>8/24/2024</a:t>
             </a:fld>
             <a:endParaRPr lang="en-US"/>
           </a:p>

</xml_diff>